<commit_message>
DLA attractor and symmetry.
</commit_message>
<xml_diff>
--- a/Procedural Map Generation Techniques.pptx
+++ b/Procedural Map Generation Techniques.pptx
@@ -5,7 +5,7 @@
     <p:sldMasterId id="2147483648" r:id="rId1"/>
   </p:sldMasterIdLst>
   <p:notesMasterIdLst>
-    <p:notesMasterId r:id="rId56"/>
+    <p:notesMasterId r:id="rId59"/>
   </p:notesMasterIdLst>
   <p:sldIdLst>
     <p:sldId id="256" r:id="rId2"/>
@@ -47,21 +47,24 @@
     <p:sldId id="316" r:id="rId38"/>
     <p:sldId id="317" r:id="rId39"/>
     <p:sldId id="318" r:id="rId40"/>
-    <p:sldId id="265" r:id="rId41"/>
-    <p:sldId id="267" r:id="rId42"/>
-    <p:sldId id="268" r:id="rId43"/>
-    <p:sldId id="269" r:id="rId44"/>
-    <p:sldId id="277" r:id="rId45"/>
-    <p:sldId id="273" r:id="rId46"/>
-    <p:sldId id="309" r:id="rId47"/>
-    <p:sldId id="310" r:id="rId48"/>
-    <p:sldId id="314" r:id="rId49"/>
-    <p:sldId id="311" r:id="rId50"/>
-    <p:sldId id="312" r:id="rId51"/>
-    <p:sldId id="313" r:id="rId52"/>
-    <p:sldId id="279" r:id="rId53"/>
-    <p:sldId id="275" r:id="rId54"/>
-    <p:sldId id="276" r:id="rId55"/>
+    <p:sldId id="319" r:id="rId41"/>
+    <p:sldId id="320" r:id="rId42"/>
+    <p:sldId id="321" r:id="rId43"/>
+    <p:sldId id="265" r:id="rId44"/>
+    <p:sldId id="267" r:id="rId45"/>
+    <p:sldId id="268" r:id="rId46"/>
+    <p:sldId id="269" r:id="rId47"/>
+    <p:sldId id="277" r:id="rId48"/>
+    <p:sldId id="273" r:id="rId49"/>
+    <p:sldId id="309" r:id="rId50"/>
+    <p:sldId id="310" r:id="rId51"/>
+    <p:sldId id="314" r:id="rId52"/>
+    <p:sldId id="311" r:id="rId53"/>
+    <p:sldId id="312" r:id="rId54"/>
+    <p:sldId id="313" r:id="rId55"/>
+    <p:sldId id="279" r:id="rId56"/>
+    <p:sldId id="275" r:id="rId57"/>
+    <p:sldId id="276" r:id="rId58"/>
   </p:sldIdLst>
   <p:sldSz cx="12192000" cy="6858000"/>
   <p:notesSz cx="6858000" cy="9144000"/>
@@ -250,7 +253,7 @@
           <a:p>
             <a:fld id="{D65FA38F-B7EE-40A5-BF0A-424611451B5A}" type="datetimeFigureOut">
               <a:rPr lang="en-US" smtClean="0"/>
-              <a:t>9/11/2020</a:t>
+              <a:t>9/12/2020</a:t>
             </a:fld>
             <a:endParaRPr lang="en-US"/>
           </a:p>
@@ -693,7 +696,7 @@
             <a:fld id="{C45E667B-40C4-4F6A-8EF0-B6EBD52DE697}" type="datetimeFigureOut">
               <a:rPr lang="en-US" smtClean="0"/>
               <a:pPr/>
-              <a:t>9/11/2020</a:t>
+              <a:t>9/12/2020</a:t>
             </a:fld>
             <a:endParaRPr lang="en-US" dirty="0"/>
           </a:p>
@@ -909,7 +912,7 @@
           <a:p>
             <a:fld id="{C45E667B-40C4-4F6A-8EF0-B6EBD52DE697}" type="datetimeFigureOut">
               <a:rPr lang="en-US" smtClean="0"/>
-              <a:t>9/11/2020</a:t>
+              <a:t>9/12/2020</a:t>
             </a:fld>
             <a:endParaRPr lang="en-US"/>
           </a:p>
@@ -1117,7 +1120,7 @@
           <a:p>
             <a:fld id="{C45E667B-40C4-4F6A-8EF0-B6EBD52DE697}" type="datetimeFigureOut">
               <a:rPr lang="en-US" smtClean="0"/>
-              <a:t>9/11/2020</a:t>
+              <a:t>9/12/2020</a:t>
             </a:fld>
             <a:endParaRPr lang="en-US"/>
           </a:p>
@@ -1377,7 +1380,7 @@
           <a:p>
             <a:fld id="{C45E667B-40C4-4F6A-8EF0-B6EBD52DE697}" type="datetimeFigureOut">
               <a:rPr lang="en-US" smtClean="0"/>
-              <a:t>9/11/2020</a:t>
+              <a:t>9/12/2020</a:t>
             </a:fld>
             <a:endParaRPr lang="en-US"/>
           </a:p>
@@ -1660,7 +1663,7 @@
           <a:p>
             <a:fld id="{C45E667B-40C4-4F6A-8EF0-B6EBD52DE697}" type="datetimeFigureOut">
               <a:rPr lang="en-US" smtClean="0"/>
-              <a:t>9/11/2020</a:t>
+              <a:t>9/12/2020</a:t>
             </a:fld>
             <a:endParaRPr lang="en-US"/>
           </a:p>
@@ -2038,7 +2041,7 @@
           <a:p>
             <a:fld id="{C45E667B-40C4-4F6A-8EF0-B6EBD52DE697}" type="datetimeFigureOut">
               <a:rPr lang="en-US" smtClean="0"/>
-              <a:t>9/11/2020</a:t>
+              <a:t>9/12/2020</a:t>
             </a:fld>
             <a:endParaRPr lang="en-US"/>
           </a:p>
@@ -2450,7 +2453,7 @@
           <a:p>
             <a:fld id="{C45E667B-40C4-4F6A-8EF0-B6EBD52DE697}" type="datetimeFigureOut">
               <a:rPr lang="en-US" smtClean="0"/>
-              <a:t>9/11/2020</a:t>
+              <a:t>9/12/2020</a:t>
             </a:fld>
             <a:endParaRPr lang="en-US"/>
           </a:p>
@@ -2591,7 +2594,7 @@
           <a:p>
             <a:fld id="{C45E667B-40C4-4F6A-8EF0-B6EBD52DE697}" type="datetimeFigureOut">
               <a:rPr lang="en-US" smtClean="0"/>
-              <a:t>9/11/2020</a:t>
+              <a:t>9/12/2020</a:t>
             </a:fld>
             <a:endParaRPr lang="en-US"/>
           </a:p>
@@ -2704,7 +2707,7 @@
           <a:p>
             <a:fld id="{C45E667B-40C4-4F6A-8EF0-B6EBD52DE697}" type="datetimeFigureOut">
               <a:rPr lang="en-US" smtClean="0"/>
-              <a:t>9/11/2020</a:t>
+              <a:t>9/12/2020</a:t>
             </a:fld>
             <a:endParaRPr lang="en-US"/>
           </a:p>
@@ -3015,7 +3018,7 @@
           <a:p>
             <a:fld id="{C45E667B-40C4-4F6A-8EF0-B6EBD52DE697}" type="datetimeFigureOut">
               <a:rPr lang="en-US" smtClean="0"/>
-              <a:t>9/11/2020</a:t>
+              <a:t>9/12/2020</a:t>
             </a:fld>
             <a:endParaRPr lang="en-US"/>
           </a:p>
@@ -3303,7 +3306,7 @@
           <a:p>
             <a:fld id="{C45E667B-40C4-4F6A-8EF0-B6EBD52DE697}" type="datetimeFigureOut">
               <a:rPr lang="en-US" smtClean="0"/>
-              <a:t>9/11/2020</a:t>
+              <a:t>9/12/2020</a:t>
             </a:fld>
             <a:endParaRPr lang="en-US"/>
           </a:p>
@@ -3553,7 +3556,7 @@
           <a:p>
             <a:fld id="{C45E667B-40C4-4F6A-8EF0-B6EBD52DE697}" type="datetimeFigureOut">
               <a:rPr lang="en-US" smtClean="0"/>
-              <a:t>9/11/2020</a:t>
+              <a:t>9/12/2020</a:t>
             </a:fld>
             <a:endParaRPr lang="en-US"/>
           </a:p>
@@ -7247,7 +7250,7 @@
           <p:cNvPr id="2" name="Title 1">
             <a:extLst>
               <a:ext uri="{FF2B5EF4-FFF2-40B4-BE49-F238E27FC236}">
-                <a16:creationId xmlns:a16="http://schemas.microsoft.com/office/drawing/2014/main" id="{A86B5833-62CF-4400-9A8D-F3E212C7B926}"/>
+                <a16:creationId xmlns:a16="http://schemas.microsoft.com/office/drawing/2014/main" id="{D637CBC3-E902-49CF-ACD3-D8F90FE417F5}"/>
               </a:ext>
             </a:extLst>
           </p:cNvPr>
@@ -7265,7 +7268,7 @@
           <a:p>
             <a:r>
               <a:rPr lang="en-US" dirty="0"/>
-              <a:t>Voronoi Hive Maps</a:t>
+              <a:t>DLA Variations</a:t>
             </a:r>
           </a:p>
         </p:txBody>
@@ -7275,7 +7278,7 @@
           <p:cNvPr id="3" name="Content Placeholder 2">
             <a:extLst>
               <a:ext uri="{FF2B5EF4-FFF2-40B4-BE49-F238E27FC236}">
-                <a16:creationId xmlns:a16="http://schemas.microsoft.com/office/drawing/2014/main" id="{9B116533-FB78-43F8-9FB7-C7AA0C566349}"/>
+                <a16:creationId xmlns:a16="http://schemas.microsoft.com/office/drawing/2014/main" id="{F066B7B8-B5DF-4D83-9832-36B7AB93C54D}"/>
               </a:ext>
             </a:extLst>
           </p:cNvPr>
@@ -7291,14 +7294,29 @@
           <a:bodyPr/>
           <a:lstStyle/>
           <a:p>
-            <a:endParaRPr lang="en-US"/>
+            <a:r>
+              <a:rPr lang="en-US" dirty="0"/>
+              <a:t>Change how the particle travels.</a:t>
+            </a:r>
+          </a:p>
+          <a:p>
+            <a:r>
+              <a:rPr lang="en-US" dirty="0"/>
+              <a:t>Outwards: start in the middle and keep going outwards until you hit a wall. Very similar to drunkard’s walk.</a:t>
+            </a:r>
+          </a:p>
+          <a:p>
+            <a:r>
+              <a:rPr lang="en-US" dirty="0"/>
+              <a:t>Attractor: attract particles towards a point, for an open center with random edges.</a:t>
+            </a:r>
           </a:p>
         </p:txBody>
       </p:sp>
     </p:spTree>
     <p:extLst>
       <p:ext uri="{BB962C8B-B14F-4D97-AF65-F5344CB8AC3E}">
-        <p14:creationId xmlns:p14="http://schemas.microsoft.com/office/powerpoint/2010/main" val="2865588890"/>
+        <p14:creationId xmlns:p14="http://schemas.microsoft.com/office/powerpoint/2010/main" val="1364245345"/>
       </p:ext>
     </p:extLst>
   </p:cSld>
@@ -7330,7 +7348,7 @@
           <p:cNvPr id="2" name="Title 1">
             <a:extLst>
               <a:ext uri="{FF2B5EF4-FFF2-40B4-BE49-F238E27FC236}">
-                <a16:creationId xmlns:a16="http://schemas.microsoft.com/office/drawing/2014/main" id="{64E18A49-DBDA-4CD7-A663-F9E8E2FFAFF0}"/>
+                <a16:creationId xmlns:a16="http://schemas.microsoft.com/office/drawing/2014/main" id="{1D0AAF2F-67B1-434F-BBA9-EFC63DCF060E}"/>
               </a:ext>
             </a:extLst>
           </p:cNvPr>
@@ -7348,57 +7366,55 @@
           <a:p>
             <a:r>
               <a:rPr lang="en-US" dirty="0"/>
-              <a:t>PART 2 – Meta-Builders</a:t>
-            </a:r>
-          </a:p>
-        </p:txBody>
-      </p:sp>
-      <p:sp>
-        <p:nvSpPr>
-          <p:cNvPr id="3" name="Content Placeholder 2">
-            <a:extLst>
-              <a:ext uri="{FF2B5EF4-FFF2-40B4-BE49-F238E27FC236}">
-                <a16:creationId xmlns:a16="http://schemas.microsoft.com/office/drawing/2014/main" id="{A6346E82-7C8C-4960-B9B3-A0E6B3AEF447}"/>
-              </a:ext>
-            </a:extLst>
-          </p:cNvPr>
-          <p:cNvSpPr>
-            <a:spLocks noGrp="1"/>
-          </p:cNvSpPr>
+              <a:t>Animated Central</a:t>
+            </a:r>
+            <a:r>
+              <a:rPr lang="en-US" baseline="0" dirty="0"/>
+              <a:t> Attractor DLA</a:t>
+            </a:r>
+            <a:endParaRPr lang="en-US" dirty="0"/>
+          </a:p>
+        </p:txBody>
+      </p:sp>
+      <p:pic>
+        <p:nvPicPr>
+          <p:cNvPr id="5" name="Content Placeholder 4">
+            <a:extLst>
+              <a:ext uri="{FF2B5EF4-FFF2-40B4-BE49-F238E27FC236}">
+                <a16:creationId xmlns:a16="http://schemas.microsoft.com/office/drawing/2014/main" id="{C09B8C3B-CC93-404D-80E8-6F0EA17E68E8}"/>
+              </a:ext>
+            </a:extLst>
+          </p:cNvPr>
+          <p:cNvPicPr>
+            <a:picLocks noGrp="1" noChangeAspect="1"/>
+          </p:cNvPicPr>
           <p:nvPr>
             <p:ph idx="1"/>
           </p:nvPr>
-        </p:nvSpPr>
-        <p:spPr/>
-        <p:txBody>
-          <a:bodyPr/>
-          <a:lstStyle/>
-          <a:p>
-            <a:r>
-              <a:rPr lang="en-US" dirty="0"/>
-              <a:t>One algorithm isn’t always enough.</a:t>
-            </a:r>
-          </a:p>
-          <a:p>
-            <a:r>
-              <a:rPr lang="en-US" dirty="0"/>
-              <a:t>You can always run a </a:t>
-            </a:r>
-            <a:r>
-              <a:rPr lang="en-US" i="1" dirty="0"/>
-              <a:t>second</a:t>
-            </a:r>
-            <a:r>
-              <a:rPr lang="en-US" dirty="0"/>
-              <a:t> algorithm using your first as its input.</a:t>
-            </a:r>
-          </a:p>
-        </p:txBody>
-      </p:sp>
+        </p:nvPicPr>
+        <p:blipFill>
+          <a:blip r:embed="rId2">
+            <a:extLst>
+              <a:ext uri="{28A0092B-C50C-407E-A947-70E740481C1C}">
+                <a14:useLocalDpi xmlns:a14="http://schemas.microsoft.com/office/drawing/2010/main" val="0"/>
+              </a:ext>
+            </a:extLst>
+          </a:blip>
+          <a:stretch>
+            <a:fillRect/>
+          </a:stretch>
+        </p:blipFill>
+        <p:spPr>
+          <a:xfrm>
+            <a:off x="3067050" y="2091531"/>
+            <a:ext cx="6057900" cy="3819525"/>
+          </a:xfrm>
+        </p:spPr>
+      </p:pic>
     </p:spTree>
     <p:extLst>
       <p:ext uri="{BB962C8B-B14F-4D97-AF65-F5344CB8AC3E}">
-        <p14:creationId xmlns:p14="http://schemas.microsoft.com/office/powerpoint/2010/main" val="137979892"/>
+        <p14:creationId xmlns:p14="http://schemas.microsoft.com/office/powerpoint/2010/main" val="3798626458"/>
       </p:ext>
     </p:extLst>
   </p:cSld>
@@ -7430,7 +7446,7 @@
           <p:cNvPr id="2" name="Title 1">
             <a:extLst>
               <a:ext uri="{FF2B5EF4-FFF2-40B4-BE49-F238E27FC236}">
-                <a16:creationId xmlns:a16="http://schemas.microsoft.com/office/drawing/2014/main" id="{41E81F0C-9813-4A7A-824E-C66E053B5032}"/>
+                <a16:creationId xmlns:a16="http://schemas.microsoft.com/office/drawing/2014/main" id="{6643D781-8BDC-431D-81B0-4983FB31A4AE}"/>
               </a:ext>
             </a:extLst>
           </p:cNvPr>
@@ -7448,40 +7464,50 @@
           <a:p>
             <a:r>
               <a:rPr lang="en-US" dirty="0"/>
-              <a:t>Eroding Maps</a:t>
-            </a:r>
-          </a:p>
-        </p:txBody>
-      </p:sp>
-      <p:sp>
-        <p:nvSpPr>
-          <p:cNvPr id="3" name="Content Placeholder 2">
-            <a:extLst>
-              <a:ext uri="{FF2B5EF4-FFF2-40B4-BE49-F238E27FC236}">
-                <a16:creationId xmlns:a16="http://schemas.microsoft.com/office/drawing/2014/main" id="{BF5F7A17-9452-4B16-A18A-86EBF039A787}"/>
-              </a:ext>
-            </a:extLst>
-          </p:cNvPr>
-          <p:cNvSpPr>
-            <a:spLocks noGrp="1"/>
-          </p:cNvSpPr>
+              <a:t>Symmetrical DLA</a:t>
+            </a:r>
+          </a:p>
+        </p:txBody>
+      </p:sp>
+      <p:pic>
+        <p:nvPicPr>
+          <p:cNvPr id="5" name="Content Placeholder 4">
+            <a:extLst>
+              <a:ext uri="{FF2B5EF4-FFF2-40B4-BE49-F238E27FC236}">
+                <a16:creationId xmlns:a16="http://schemas.microsoft.com/office/drawing/2014/main" id="{5C060987-5BBB-4C33-987B-8FD7494B7E2A}"/>
+              </a:ext>
+            </a:extLst>
+          </p:cNvPr>
+          <p:cNvPicPr>
+            <a:picLocks noGrp="1" noChangeAspect="1"/>
+          </p:cNvPicPr>
           <p:nvPr>
             <p:ph idx="1"/>
           </p:nvPr>
-        </p:nvSpPr>
-        <p:spPr/>
-        <p:txBody>
-          <a:bodyPr/>
-          <a:lstStyle/>
-          <a:p>
-            <a:endParaRPr lang="en-US"/>
-          </a:p>
-        </p:txBody>
-      </p:sp>
+        </p:nvPicPr>
+        <p:blipFill>
+          <a:blip r:embed="rId2">
+            <a:extLst>
+              <a:ext uri="{28A0092B-C50C-407E-A947-70E740481C1C}">
+                <a14:useLocalDpi xmlns:a14="http://schemas.microsoft.com/office/drawing/2010/main" val="0"/>
+              </a:ext>
+            </a:extLst>
+          </a:blip>
+          <a:stretch>
+            <a:fillRect/>
+          </a:stretch>
+        </p:blipFill>
+        <p:spPr>
+          <a:xfrm>
+            <a:off x="3067050" y="2091531"/>
+            <a:ext cx="6057900" cy="3819525"/>
+          </a:xfrm>
+        </p:spPr>
+      </p:pic>
     </p:spTree>
     <p:extLst>
       <p:ext uri="{BB962C8B-B14F-4D97-AF65-F5344CB8AC3E}">
-        <p14:creationId xmlns:p14="http://schemas.microsoft.com/office/powerpoint/2010/main" val="3467330287"/>
+        <p14:creationId xmlns:p14="http://schemas.microsoft.com/office/powerpoint/2010/main" val="817542309"/>
       </p:ext>
     </p:extLst>
   </p:cSld>
@@ -7513,7 +7539,7 @@
           <p:cNvPr id="2" name="Title 1">
             <a:extLst>
               <a:ext uri="{FF2B5EF4-FFF2-40B4-BE49-F238E27FC236}">
-                <a16:creationId xmlns:a16="http://schemas.microsoft.com/office/drawing/2014/main" id="{B6039A8A-4F8D-4655-8228-4ED9280DC988}"/>
+                <a16:creationId xmlns:a16="http://schemas.microsoft.com/office/drawing/2014/main" id="{A86B5833-62CF-4400-9A8D-F3E212C7B926}"/>
               </a:ext>
             </a:extLst>
           </p:cNvPr>
@@ -7531,7 +7557,7 @@
           <a:p>
             <a:r>
               <a:rPr lang="en-US" dirty="0"/>
-              <a:t>Combining Layers</a:t>
+              <a:t>Voronoi Hive Maps</a:t>
             </a:r>
           </a:p>
         </p:txBody>
@@ -7541,7 +7567,7 @@
           <p:cNvPr id="3" name="Content Placeholder 2">
             <a:extLst>
               <a:ext uri="{FF2B5EF4-FFF2-40B4-BE49-F238E27FC236}">
-                <a16:creationId xmlns:a16="http://schemas.microsoft.com/office/drawing/2014/main" id="{46D44358-4CED-48CA-B84A-FE789F2F3AF2}"/>
+                <a16:creationId xmlns:a16="http://schemas.microsoft.com/office/drawing/2014/main" id="{9B116533-FB78-43F8-9FB7-C7AA0C566349}"/>
               </a:ext>
             </a:extLst>
           </p:cNvPr>
@@ -7564,7 +7590,7 @@
     </p:spTree>
     <p:extLst>
       <p:ext uri="{BB962C8B-B14F-4D97-AF65-F5344CB8AC3E}">
-        <p14:creationId xmlns:p14="http://schemas.microsoft.com/office/powerpoint/2010/main" val="3639117625"/>
+        <p14:creationId xmlns:p14="http://schemas.microsoft.com/office/powerpoint/2010/main" val="2865588890"/>
       </p:ext>
     </p:extLst>
   </p:cSld>
@@ -7596,7 +7622,7 @@
           <p:cNvPr id="2" name="Title 1">
             <a:extLst>
               <a:ext uri="{FF2B5EF4-FFF2-40B4-BE49-F238E27FC236}">
-                <a16:creationId xmlns:a16="http://schemas.microsoft.com/office/drawing/2014/main" id="{F63898EB-EB14-4AA3-A2F3-93F16F823063}"/>
+                <a16:creationId xmlns:a16="http://schemas.microsoft.com/office/drawing/2014/main" id="{64E18A49-DBDA-4CD7-A663-F9E8E2FFAFF0}"/>
               </a:ext>
             </a:extLst>
           </p:cNvPr>
@@ -7614,7 +7640,7 @@
           <a:p>
             <a:r>
               <a:rPr lang="en-US" dirty="0"/>
-              <a:t>Waveform Collapse</a:t>
+              <a:t>PART 2 – Meta-Builders</a:t>
             </a:r>
           </a:p>
         </p:txBody>
@@ -7624,7 +7650,7 @@
           <p:cNvPr id="3" name="Content Placeholder 2">
             <a:extLst>
               <a:ext uri="{FF2B5EF4-FFF2-40B4-BE49-F238E27FC236}">
-                <a16:creationId xmlns:a16="http://schemas.microsoft.com/office/drawing/2014/main" id="{E769680E-43CF-41B6-8525-D20C6F361581}"/>
+                <a16:creationId xmlns:a16="http://schemas.microsoft.com/office/drawing/2014/main" id="{A6346E82-7C8C-4960-B9B3-A0E6B3AEF447}"/>
               </a:ext>
             </a:extLst>
           </p:cNvPr>
@@ -7640,14 +7666,31 @@
           <a:bodyPr/>
           <a:lstStyle/>
           <a:p>
-            <a:endParaRPr lang="en-US"/>
+            <a:r>
+              <a:rPr lang="en-US" dirty="0"/>
+              <a:t>One algorithm isn’t always enough.</a:t>
+            </a:r>
+          </a:p>
+          <a:p>
+            <a:r>
+              <a:rPr lang="en-US" dirty="0"/>
+              <a:t>You can always run a </a:t>
+            </a:r>
+            <a:r>
+              <a:rPr lang="en-US" i="1" dirty="0"/>
+              <a:t>second</a:t>
+            </a:r>
+            <a:r>
+              <a:rPr lang="en-US" dirty="0"/>
+              <a:t> algorithm using your first as its input.</a:t>
+            </a:r>
           </a:p>
         </p:txBody>
       </p:sp>
     </p:spTree>
     <p:extLst>
       <p:ext uri="{BB962C8B-B14F-4D97-AF65-F5344CB8AC3E}">
-        <p14:creationId xmlns:p14="http://schemas.microsoft.com/office/powerpoint/2010/main" val="1944686705"/>
+        <p14:creationId xmlns:p14="http://schemas.microsoft.com/office/powerpoint/2010/main" val="137979892"/>
       </p:ext>
     </p:extLst>
   </p:cSld>
@@ -7679,7 +7722,7 @@
           <p:cNvPr id="2" name="Title 1">
             <a:extLst>
               <a:ext uri="{FF2B5EF4-FFF2-40B4-BE49-F238E27FC236}">
-                <a16:creationId xmlns:a16="http://schemas.microsoft.com/office/drawing/2014/main" id="{CF0248D1-34B2-4B59-AA9F-4E5727216E39}"/>
+                <a16:creationId xmlns:a16="http://schemas.microsoft.com/office/drawing/2014/main" id="{41E81F0C-9813-4A7A-824E-C66E053B5032}"/>
               </a:ext>
             </a:extLst>
           </p:cNvPr>
@@ -7697,7 +7740,7 @@
           <a:p>
             <a:r>
               <a:rPr lang="en-US" dirty="0"/>
-              <a:t>PART 3 – Let’s Make Some Noise</a:t>
+              <a:t>Eroding Maps</a:t>
             </a:r>
           </a:p>
         </p:txBody>
@@ -7707,7 +7750,7 @@
           <p:cNvPr id="3" name="Content Placeholder 2">
             <a:extLst>
               <a:ext uri="{FF2B5EF4-FFF2-40B4-BE49-F238E27FC236}">
-                <a16:creationId xmlns:a16="http://schemas.microsoft.com/office/drawing/2014/main" id="{B5B32EE5-7262-4D89-A488-48E76C108615}"/>
+                <a16:creationId xmlns:a16="http://schemas.microsoft.com/office/drawing/2014/main" id="{BF5F7A17-9452-4B16-A18A-86EBF039A787}"/>
               </a:ext>
             </a:extLst>
           </p:cNvPr>
@@ -7730,7 +7773,7 @@
     </p:spTree>
     <p:extLst>
       <p:ext uri="{BB962C8B-B14F-4D97-AF65-F5344CB8AC3E}">
-        <p14:creationId xmlns:p14="http://schemas.microsoft.com/office/powerpoint/2010/main" val="2418747065"/>
+        <p14:creationId xmlns:p14="http://schemas.microsoft.com/office/powerpoint/2010/main" val="3467330287"/>
       </p:ext>
     </p:extLst>
   </p:cSld>
@@ -7762,7 +7805,7 @@
           <p:cNvPr id="2" name="Title 1">
             <a:extLst>
               <a:ext uri="{FF2B5EF4-FFF2-40B4-BE49-F238E27FC236}">
-                <a16:creationId xmlns:a16="http://schemas.microsoft.com/office/drawing/2014/main" id="{628D99A4-1EA2-493B-83CD-BB4E75DE9353}"/>
+                <a16:creationId xmlns:a16="http://schemas.microsoft.com/office/drawing/2014/main" id="{B6039A8A-4F8D-4655-8228-4ED9280DC988}"/>
               </a:ext>
             </a:extLst>
           </p:cNvPr>
@@ -7780,7 +7823,7 @@
           <a:p>
             <a:r>
               <a:rPr lang="en-US" dirty="0"/>
-              <a:t>Perlin &amp; Simplex Noise</a:t>
+              <a:t>Combining Layers</a:t>
             </a:r>
           </a:p>
         </p:txBody>
@@ -7790,7 +7833,7 @@
           <p:cNvPr id="3" name="Content Placeholder 2">
             <a:extLst>
               <a:ext uri="{FF2B5EF4-FFF2-40B4-BE49-F238E27FC236}">
-                <a16:creationId xmlns:a16="http://schemas.microsoft.com/office/drawing/2014/main" id="{D18B9377-FA2C-480E-AA65-99D62880BC12}"/>
+                <a16:creationId xmlns:a16="http://schemas.microsoft.com/office/drawing/2014/main" id="{46D44358-4CED-48CA-B84A-FE789F2F3AF2}"/>
               </a:ext>
             </a:extLst>
           </p:cNvPr>
@@ -7813,7 +7856,7 @@
     </p:spTree>
     <p:extLst>
       <p:ext uri="{BB962C8B-B14F-4D97-AF65-F5344CB8AC3E}">
-        <p14:creationId xmlns:p14="http://schemas.microsoft.com/office/powerpoint/2010/main" val="2910018172"/>
+        <p14:creationId xmlns:p14="http://schemas.microsoft.com/office/powerpoint/2010/main" val="3639117625"/>
       </p:ext>
     </p:extLst>
   </p:cSld>
@@ -7845,7 +7888,7 @@
           <p:cNvPr id="2" name="Title 1">
             <a:extLst>
               <a:ext uri="{FF2B5EF4-FFF2-40B4-BE49-F238E27FC236}">
-                <a16:creationId xmlns:a16="http://schemas.microsoft.com/office/drawing/2014/main" id="{D7E58CAF-E99C-42EC-B01A-F7A95C035080}"/>
+                <a16:creationId xmlns:a16="http://schemas.microsoft.com/office/drawing/2014/main" id="{F63898EB-EB14-4AA3-A2F3-93F16F823063}"/>
               </a:ext>
             </a:extLst>
           </p:cNvPr>
@@ -7863,7 +7906,7 @@
           <a:p>
             <a:r>
               <a:rPr lang="en-US" dirty="0"/>
-              <a:t>What does a Noise Map look like?</a:t>
+              <a:t>Waveform Collapse</a:t>
             </a:r>
           </a:p>
         </p:txBody>
@@ -7873,7 +7916,7 @@
           <p:cNvPr id="3" name="Content Placeholder 2">
             <a:extLst>
               <a:ext uri="{FF2B5EF4-FFF2-40B4-BE49-F238E27FC236}">
-                <a16:creationId xmlns:a16="http://schemas.microsoft.com/office/drawing/2014/main" id="{4561E8F3-1A17-4F34-97E9-29D323924418}"/>
+                <a16:creationId xmlns:a16="http://schemas.microsoft.com/office/drawing/2014/main" id="{E769680E-43CF-41B6-8525-D20C6F361581}"/>
               </a:ext>
             </a:extLst>
           </p:cNvPr>
@@ -7896,7 +7939,7 @@
     </p:spTree>
     <p:extLst>
       <p:ext uri="{BB962C8B-B14F-4D97-AF65-F5344CB8AC3E}">
-        <p14:creationId xmlns:p14="http://schemas.microsoft.com/office/powerpoint/2010/main" val="2677423220"/>
+        <p14:creationId xmlns:p14="http://schemas.microsoft.com/office/powerpoint/2010/main" val="1944686705"/>
       </p:ext>
     </p:extLst>
   </p:cSld>
@@ -7928,7 +7971,7 @@
           <p:cNvPr id="2" name="Title 1">
             <a:extLst>
               <a:ext uri="{FF2B5EF4-FFF2-40B4-BE49-F238E27FC236}">
-                <a16:creationId xmlns:a16="http://schemas.microsoft.com/office/drawing/2014/main" id="{B519C23B-C326-43A9-82A3-E417057CA84F}"/>
+                <a16:creationId xmlns:a16="http://schemas.microsoft.com/office/drawing/2014/main" id="{CF0248D1-34B2-4B59-AA9F-4E5727216E39}"/>
               </a:ext>
             </a:extLst>
           </p:cNvPr>
@@ -7946,17 +7989,8 @@
           <a:p>
             <a:r>
               <a:rPr lang="en-US" dirty="0"/>
-              <a:t>Noise</a:t>
-            </a:r>
-            <a:r>
-              <a:rPr lang="en-US" baseline="0" dirty="0"/>
-              <a:t> </a:t>
-            </a:r>
-            <a:r>
-              <a:rPr lang="en-US" baseline="0" dirty="0" err="1"/>
-              <a:t>Tunables</a:t>
-            </a:r>
-            <a:endParaRPr lang="en-US" dirty="0"/>
+              <a:t>PART 3 – Let’s Make Some Noise</a:t>
+            </a:r>
           </a:p>
         </p:txBody>
       </p:sp>
@@ -7965,7 +7999,7 @@
           <p:cNvPr id="3" name="Content Placeholder 2">
             <a:extLst>
               <a:ext uri="{FF2B5EF4-FFF2-40B4-BE49-F238E27FC236}">
-                <a16:creationId xmlns:a16="http://schemas.microsoft.com/office/drawing/2014/main" id="{282A21B9-4BE6-46F8-B5A4-D367A29441C6}"/>
+                <a16:creationId xmlns:a16="http://schemas.microsoft.com/office/drawing/2014/main" id="{B5B32EE5-7262-4D89-A488-48E76C108615}"/>
               </a:ext>
             </a:extLst>
           </p:cNvPr>
@@ -7988,7 +8022,7 @@
     </p:spTree>
     <p:extLst>
       <p:ext uri="{BB962C8B-B14F-4D97-AF65-F5344CB8AC3E}">
-        <p14:creationId xmlns:p14="http://schemas.microsoft.com/office/powerpoint/2010/main" val="1685054292"/>
+        <p14:creationId xmlns:p14="http://schemas.microsoft.com/office/powerpoint/2010/main" val="2418747065"/>
       </p:ext>
     </p:extLst>
   </p:cSld>
@@ -8020,7 +8054,7 @@
           <p:cNvPr id="2" name="Title 1">
             <a:extLst>
               <a:ext uri="{FF2B5EF4-FFF2-40B4-BE49-F238E27FC236}">
-                <a16:creationId xmlns:a16="http://schemas.microsoft.com/office/drawing/2014/main" id="{CA980F56-6CDE-4DF0-95FB-C7D83D27BD60}"/>
+                <a16:creationId xmlns:a16="http://schemas.microsoft.com/office/drawing/2014/main" id="{628D99A4-1EA2-493B-83CD-BB4E75DE9353}"/>
               </a:ext>
             </a:extLst>
           </p:cNvPr>
@@ -8038,7 +8072,7 @@
           <a:p>
             <a:r>
               <a:rPr lang="en-US" dirty="0"/>
-              <a:t>Making an Overworld</a:t>
+              <a:t>Perlin &amp; Simplex Noise</a:t>
             </a:r>
           </a:p>
         </p:txBody>
@@ -8048,7 +8082,7 @@
           <p:cNvPr id="3" name="Content Placeholder 2">
             <a:extLst>
               <a:ext uri="{FF2B5EF4-FFF2-40B4-BE49-F238E27FC236}">
-                <a16:creationId xmlns:a16="http://schemas.microsoft.com/office/drawing/2014/main" id="{CD3195FE-6603-406D-947E-468A1C20EF00}"/>
+                <a16:creationId xmlns:a16="http://schemas.microsoft.com/office/drawing/2014/main" id="{D18B9377-FA2C-480E-AA65-99D62880BC12}"/>
               </a:ext>
             </a:extLst>
           </p:cNvPr>
@@ -8071,7 +8105,7 @@
     </p:spTree>
     <p:extLst>
       <p:ext uri="{BB962C8B-B14F-4D97-AF65-F5344CB8AC3E}">
-        <p14:creationId xmlns:p14="http://schemas.microsoft.com/office/powerpoint/2010/main" val="930639465"/>
+        <p14:creationId xmlns:p14="http://schemas.microsoft.com/office/powerpoint/2010/main" val="2910018172"/>
       </p:ext>
     </p:extLst>
   </p:cSld>
@@ -8186,7 +8220,7 @@
           <p:cNvPr id="2" name="Title 1">
             <a:extLst>
               <a:ext uri="{FF2B5EF4-FFF2-40B4-BE49-F238E27FC236}">
-                <a16:creationId xmlns:a16="http://schemas.microsoft.com/office/drawing/2014/main" id="{80256ECF-6539-4DC7-9F1A-D36F4CDC03D0}"/>
+                <a16:creationId xmlns:a16="http://schemas.microsoft.com/office/drawing/2014/main" id="{D7E58CAF-E99C-42EC-B01A-F7A95C035080}"/>
               </a:ext>
             </a:extLst>
           </p:cNvPr>
@@ -8204,13 +8238,8 @@
           <a:p>
             <a:r>
               <a:rPr lang="en-US" dirty="0"/>
-              <a:t>Making a Spherical</a:t>
-            </a:r>
-            <a:r>
-              <a:rPr lang="en-US" baseline="0" dirty="0"/>
-              <a:t> World</a:t>
-            </a:r>
-            <a:endParaRPr lang="en-US" dirty="0"/>
+              <a:t>What does a Noise Map look like?</a:t>
+            </a:r>
           </a:p>
         </p:txBody>
       </p:sp>
@@ -8219,7 +8248,7 @@
           <p:cNvPr id="3" name="Content Placeholder 2">
             <a:extLst>
               <a:ext uri="{FF2B5EF4-FFF2-40B4-BE49-F238E27FC236}">
-                <a16:creationId xmlns:a16="http://schemas.microsoft.com/office/drawing/2014/main" id="{D8DDC5B9-71DA-44C0-A52E-35F421B906D6}"/>
+                <a16:creationId xmlns:a16="http://schemas.microsoft.com/office/drawing/2014/main" id="{4561E8F3-1A17-4F34-97E9-29D323924418}"/>
               </a:ext>
             </a:extLst>
           </p:cNvPr>
@@ -8242,7 +8271,7 @@
     </p:spTree>
     <p:extLst>
       <p:ext uri="{BB962C8B-B14F-4D97-AF65-F5344CB8AC3E}">
-        <p14:creationId xmlns:p14="http://schemas.microsoft.com/office/powerpoint/2010/main" val="3243957107"/>
+        <p14:creationId xmlns:p14="http://schemas.microsoft.com/office/powerpoint/2010/main" val="2677423220"/>
       </p:ext>
     </p:extLst>
   </p:cSld>
@@ -8274,7 +8303,7 @@
           <p:cNvPr id="2" name="Title 1">
             <a:extLst>
               <a:ext uri="{FF2B5EF4-FFF2-40B4-BE49-F238E27FC236}">
-                <a16:creationId xmlns:a16="http://schemas.microsoft.com/office/drawing/2014/main" id="{0B94EFC4-40E6-42F5-A41F-DA36D8AA9438}"/>
+                <a16:creationId xmlns:a16="http://schemas.microsoft.com/office/drawing/2014/main" id="{B519C23B-C326-43A9-82A3-E417057CA84F}"/>
               </a:ext>
             </a:extLst>
           </p:cNvPr>
@@ -8292,8 +8321,17 @@
           <a:p>
             <a:r>
               <a:rPr lang="en-US" dirty="0"/>
-              <a:t>Making a 3D Map</a:t>
-            </a:r>
+              <a:t>Noise</a:t>
+            </a:r>
+            <a:r>
+              <a:rPr lang="en-US" baseline="0" dirty="0"/>
+              <a:t> </a:t>
+            </a:r>
+            <a:r>
+              <a:rPr lang="en-US" baseline="0" dirty="0" err="1"/>
+              <a:t>Tunables</a:t>
+            </a:r>
+            <a:endParaRPr lang="en-US" dirty="0"/>
           </a:p>
         </p:txBody>
       </p:sp>
@@ -8302,7 +8340,7 @@
           <p:cNvPr id="3" name="Content Placeholder 2">
             <a:extLst>
               <a:ext uri="{FF2B5EF4-FFF2-40B4-BE49-F238E27FC236}">
-                <a16:creationId xmlns:a16="http://schemas.microsoft.com/office/drawing/2014/main" id="{6589C3BB-E964-45B9-A53E-56910758DD06}"/>
+                <a16:creationId xmlns:a16="http://schemas.microsoft.com/office/drawing/2014/main" id="{282A21B9-4BE6-46F8-B5A4-D367A29441C6}"/>
               </a:ext>
             </a:extLst>
           </p:cNvPr>
@@ -8325,7 +8363,7 @@
     </p:spTree>
     <p:extLst>
       <p:ext uri="{BB962C8B-B14F-4D97-AF65-F5344CB8AC3E}">
-        <p14:creationId xmlns:p14="http://schemas.microsoft.com/office/powerpoint/2010/main" val="3081661649"/>
+        <p14:creationId xmlns:p14="http://schemas.microsoft.com/office/powerpoint/2010/main" val="1685054292"/>
       </p:ext>
     </p:extLst>
   </p:cSld>
@@ -8357,7 +8395,7 @@
           <p:cNvPr id="2" name="Title 1">
             <a:extLst>
               <a:ext uri="{FF2B5EF4-FFF2-40B4-BE49-F238E27FC236}">
-                <a16:creationId xmlns:a16="http://schemas.microsoft.com/office/drawing/2014/main" id="{89C36EFD-6BB0-4705-BD82-297BA51C0014}"/>
+                <a16:creationId xmlns:a16="http://schemas.microsoft.com/office/drawing/2014/main" id="{CA980F56-6CDE-4DF0-95FB-C7D83D27BD60}"/>
               </a:ext>
             </a:extLst>
           </p:cNvPr>
@@ -8375,7 +8413,7 @@
           <a:p>
             <a:r>
               <a:rPr lang="en-US" dirty="0"/>
-              <a:t>PART 4 – Prefabs/Vaults</a:t>
+              <a:t>Making an Overworld</a:t>
             </a:r>
           </a:p>
         </p:txBody>
@@ -8385,7 +8423,7 @@
           <p:cNvPr id="3" name="Content Placeholder 2">
             <a:extLst>
               <a:ext uri="{FF2B5EF4-FFF2-40B4-BE49-F238E27FC236}">
-                <a16:creationId xmlns:a16="http://schemas.microsoft.com/office/drawing/2014/main" id="{16DFB016-3A47-4BD6-9336-E19F787A0A4A}"/>
+                <a16:creationId xmlns:a16="http://schemas.microsoft.com/office/drawing/2014/main" id="{CD3195FE-6603-406D-947E-468A1C20EF00}"/>
               </a:ext>
             </a:extLst>
           </p:cNvPr>
@@ -8408,7 +8446,7 @@
     </p:spTree>
     <p:extLst>
       <p:ext uri="{BB962C8B-B14F-4D97-AF65-F5344CB8AC3E}">
-        <p14:creationId xmlns:p14="http://schemas.microsoft.com/office/powerpoint/2010/main" val="1537678333"/>
+        <p14:creationId xmlns:p14="http://schemas.microsoft.com/office/powerpoint/2010/main" val="930639465"/>
       </p:ext>
     </p:extLst>
   </p:cSld>
@@ -8440,6 +8478,260 @@
           <p:cNvPr id="2" name="Title 1">
             <a:extLst>
               <a:ext uri="{FF2B5EF4-FFF2-40B4-BE49-F238E27FC236}">
+                <a16:creationId xmlns:a16="http://schemas.microsoft.com/office/drawing/2014/main" id="{80256ECF-6539-4DC7-9F1A-D36F4CDC03D0}"/>
+              </a:ext>
+            </a:extLst>
+          </p:cNvPr>
+          <p:cNvSpPr>
+            <a:spLocks noGrp="1"/>
+          </p:cNvSpPr>
+          <p:nvPr>
+            <p:ph type="title"/>
+          </p:nvPr>
+        </p:nvSpPr>
+        <p:spPr/>
+        <p:txBody>
+          <a:bodyPr/>
+          <a:lstStyle/>
+          <a:p>
+            <a:r>
+              <a:rPr lang="en-US" dirty="0"/>
+              <a:t>Making a Spherical</a:t>
+            </a:r>
+            <a:r>
+              <a:rPr lang="en-US" baseline="0" dirty="0"/>
+              <a:t> World</a:t>
+            </a:r>
+            <a:endParaRPr lang="en-US" dirty="0"/>
+          </a:p>
+        </p:txBody>
+      </p:sp>
+      <p:sp>
+        <p:nvSpPr>
+          <p:cNvPr id="3" name="Content Placeholder 2">
+            <a:extLst>
+              <a:ext uri="{FF2B5EF4-FFF2-40B4-BE49-F238E27FC236}">
+                <a16:creationId xmlns:a16="http://schemas.microsoft.com/office/drawing/2014/main" id="{D8DDC5B9-71DA-44C0-A52E-35F421B906D6}"/>
+              </a:ext>
+            </a:extLst>
+          </p:cNvPr>
+          <p:cNvSpPr>
+            <a:spLocks noGrp="1"/>
+          </p:cNvSpPr>
+          <p:nvPr>
+            <p:ph idx="1"/>
+          </p:nvPr>
+        </p:nvSpPr>
+        <p:spPr/>
+        <p:txBody>
+          <a:bodyPr/>
+          <a:lstStyle/>
+          <a:p>
+            <a:endParaRPr lang="en-US"/>
+          </a:p>
+        </p:txBody>
+      </p:sp>
+    </p:spTree>
+    <p:extLst>
+      <p:ext uri="{BB962C8B-B14F-4D97-AF65-F5344CB8AC3E}">
+        <p14:creationId xmlns:p14="http://schemas.microsoft.com/office/powerpoint/2010/main" val="3243957107"/>
+      </p:ext>
+    </p:extLst>
+  </p:cSld>
+  <p:clrMapOvr>
+    <a:masterClrMapping/>
+  </p:clrMapOvr>
+</p:sld>
+</file>
+
+<file path=ppt/slides/slide54.xml><?xml version="1.0" encoding="utf-8"?>
+<p:sld xmlns:a="http://schemas.openxmlformats.org/drawingml/2006/main" xmlns:r="http://schemas.openxmlformats.org/officeDocument/2006/relationships" xmlns:p="http://schemas.openxmlformats.org/presentationml/2006/main">
+  <p:cSld>
+    <p:spTree>
+      <p:nvGrpSpPr>
+        <p:cNvPr id="1" name=""/>
+        <p:cNvGrpSpPr/>
+        <p:nvPr/>
+      </p:nvGrpSpPr>
+      <p:grpSpPr>
+        <a:xfrm>
+          <a:off x="0" y="0"/>
+          <a:ext cx="0" cy="0"/>
+          <a:chOff x="0" y="0"/>
+          <a:chExt cx="0" cy="0"/>
+        </a:xfrm>
+      </p:grpSpPr>
+      <p:sp>
+        <p:nvSpPr>
+          <p:cNvPr id="2" name="Title 1">
+            <a:extLst>
+              <a:ext uri="{FF2B5EF4-FFF2-40B4-BE49-F238E27FC236}">
+                <a16:creationId xmlns:a16="http://schemas.microsoft.com/office/drawing/2014/main" id="{0B94EFC4-40E6-42F5-A41F-DA36D8AA9438}"/>
+              </a:ext>
+            </a:extLst>
+          </p:cNvPr>
+          <p:cNvSpPr>
+            <a:spLocks noGrp="1"/>
+          </p:cNvSpPr>
+          <p:nvPr>
+            <p:ph type="title"/>
+          </p:nvPr>
+        </p:nvSpPr>
+        <p:spPr/>
+        <p:txBody>
+          <a:bodyPr/>
+          <a:lstStyle/>
+          <a:p>
+            <a:r>
+              <a:rPr lang="en-US" dirty="0"/>
+              <a:t>Making a 3D Map</a:t>
+            </a:r>
+          </a:p>
+        </p:txBody>
+      </p:sp>
+      <p:sp>
+        <p:nvSpPr>
+          <p:cNvPr id="3" name="Content Placeholder 2">
+            <a:extLst>
+              <a:ext uri="{FF2B5EF4-FFF2-40B4-BE49-F238E27FC236}">
+                <a16:creationId xmlns:a16="http://schemas.microsoft.com/office/drawing/2014/main" id="{6589C3BB-E964-45B9-A53E-56910758DD06}"/>
+              </a:ext>
+            </a:extLst>
+          </p:cNvPr>
+          <p:cNvSpPr>
+            <a:spLocks noGrp="1"/>
+          </p:cNvSpPr>
+          <p:nvPr>
+            <p:ph idx="1"/>
+          </p:nvPr>
+        </p:nvSpPr>
+        <p:spPr/>
+        <p:txBody>
+          <a:bodyPr/>
+          <a:lstStyle/>
+          <a:p>
+            <a:endParaRPr lang="en-US"/>
+          </a:p>
+        </p:txBody>
+      </p:sp>
+    </p:spTree>
+    <p:extLst>
+      <p:ext uri="{BB962C8B-B14F-4D97-AF65-F5344CB8AC3E}">
+        <p14:creationId xmlns:p14="http://schemas.microsoft.com/office/powerpoint/2010/main" val="3081661649"/>
+      </p:ext>
+    </p:extLst>
+  </p:cSld>
+  <p:clrMapOvr>
+    <a:masterClrMapping/>
+  </p:clrMapOvr>
+</p:sld>
+</file>
+
+<file path=ppt/slides/slide55.xml><?xml version="1.0" encoding="utf-8"?>
+<p:sld xmlns:a="http://schemas.openxmlformats.org/drawingml/2006/main" xmlns:r="http://schemas.openxmlformats.org/officeDocument/2006/relationships" xmlns:p="http://schemas.openxmlformats.org/presentationml/2006/main">
+  <p:cSld>
+    <p:spTree>
+      <p:nvGrpSpPr>
+        <p:cNvPr id="1" name=""/>
+        <p:cNvGrpSpPr/>
+        <p:nvPr/>
+      </p:nvGrpSpPr>
+      <p:grpSpPr>
+        <a:xfrm>
+          <a:off x="0" y="0"/>
+          <a:ext cx="0" cy="0"/>
+          <a:chOff x="0" y="0"/>
+          <a:chExt cx="0" cy="0"/>
+        </a:xfrm>
+      </p:grpSpPr>
+      <p:sp>
+        <p:nvSpPr>
+          <p:cNvPr id="2" name="Title 1">
+            <a:extLst>
+              <a:ext uri="{FF2B5EF4-FFF2-40B4-BE49-F238E27FC236}">
+                <a16:creationId xmlns:a16="http://schemas.microsoft.com/office/drawing/2014/main" id="{89C36EFD-6BB0-4705-BD82-297BA51C0014}"/>
+              </a:ext>
+            </a:extLst>
+          </p:cNvPr>
+          <p:cNvSpPr>
+            <a:spLocks noGrp="1"/>
+          </p:cNvSpPr>
+          <p:nvPr>
+            <p:ph type="title"/>
+          </p:nvPr>
+        </p:nvSpPr>
+        <p:spPr/>
+        <p:txBody>
+          <a:bodyPr/>
+          <a:lstStyle/>
+          <a:p>
+            <a:r>
+              <a:rPr lang="en-US" dirty="0"/>
+              <a:t>PART 4 – Prefabs/Vaults</a:t>
+            </a:r>
+          </a:p>
+        </p:txBody>
+      </p:sp>
+      <p:sp>
+        <p:nvSpPr>
+          <p:cNvPr id="3" name="Content Placeholder 2">
+            <a:extLst>
+              <a:ext uri="{FF2B5EF4-FFF2-40B4-BE49-F238E27FC236}">
+                <a16:creationId xmlns:a16="http://schemas.microsoft.com/office/drawing/2014/main" id="{16DFB016-3A47-4BD6-9336-E19F787A0A4A}"/>
+              </a:ext>
+            </a:extLst>
+          </p:cNvPr>
+          <p:cNvSpPr>
+            <a:spLocks noGrp="1"/>
+          </p:cNvSpPr>
+          <p:nvPr>
+            <p:ph idx="1"/>
+          </p:nvPr>
+        </p:nvSpPr>
+        <p:spPr/>
+        <p:txBody>
+          <a:bodyPr/>
+          <a:lstStyle/>
+          <a:p>
+            <a:endParaRPr lang="en-US"/>
+          </a:p>
+        </p:txBody>
+      </p:sp>
+    </p:spTree>
+    <p:extLst>
+      <p:ext uri="{BB962C8B-B14F-4D97-AF65-F5344CB8AC3E}">
+        <p14:creationId xmlns:p14="http://schemas.microsoft.com/office/powerpoint/2010/main" val="1537678333"/>
+      </p:ext>
+    </p:extLst>
+  </p:cSld>
+  <p:clrMapOvr>
+    <a:masterClrMapping/>
+  </p:clrMapOvr>
+</p:sld>
+</file>
+
+<file path=ppt/slides/slide56.xml><?xml version="1.0" encoding="utf-8"?>
+<p:sld xmlns:a="http://schemas.openxmlformats.org/drawingml/2006/main" xmlns:r="http://schemas.openxmlformats.org/officeDocument/2006/relationships" xmlns:p="http://schemas.openxmlformats.org/presentationml/2006/main">
+  <p:cSld>
+    <p:spTree>
+      <p:nvGrpSpPr>
+        <p:cNvPr id="1" name=""/>
+        <p:cNvGrpSpPr/>
+        <p:nvPr/>
+      </p:nvGrpSpPr>
+      <p:grpSpPr>
+        <a:xfrm>
+          <a:off x="0" y="0"/>
+          <a:ext cx="0" cy="0"/>
+          <a:chOff x="0" y="0"/>
+          <a:chExt cx="0" cy="0"/>
+        </a:xfrm>
+      </p:grpSpPr>
+      <p:sp>
+        <p:nvSpPr>
+          <p:cNvPr id="2" name="Title 1">
+            <a:extLst>
+              <a:ext uri="{FF2B5EF4-FFF2-40B4-BE49-F238E27FC236}">
                 <a16:creationId xmlns:a16="http://schemas.microsoft.com/office/drawing/2014/main" id="{954AC10A-DCC4-40DF-8C7C-80872799F6B6}"/>
               </a:ext>
             </a:extLst>
@@ -8501,7 +8793,7 @@
 </p:sld>
 </file>
 
-<file path=ppt/slides/slide54.xml><?xml version="1.0" encoding="utf-8"?>
+<file path=ppt/slides/slide57.xml><?xml version="1.0" encoding="utf-8"?>
 <p:sld xmlns:a="http://schemas.openxmlformats.org/drawingml/2006/main" xmlns:r="http://schemas.openxmlformats.org/officeDocument/2006/relationships" xmlns:p="http://schemas.openxmlformats.org/presentationml/2006/main">
   <p:cSld>
     <p:spTree>

</xml_diff>